<commit_message>
Update PPT and RMD
Added text to my slides.
</commit_message>
<xml_diff>
--- a/EDA_Presentation.pptx
+++ b/EDA_Presentation.pptx
@@ -4,6 +4,9 @@
   <p:sldMasterIdLst>
     <p:sldMasterId id="2147483648" r:id="rId1"/>
   </p:sldMasterIdLst>
+  <p:notesMasterIdLst>
+    <p:notesMasterId r:id="rId11"/>
+  </p:notesMasterIdLst>
   <p:sldIdLst>
     <p:sldId id="256" r:id="rId2"/>
     <p:sldId id="257" r:id="rId3"/>
@@ -118,6 +121,355 @@
     </p:ext>
   </p:extLst>
 </p:presentation>
+</file>
+
+<file path=ppt/notesMasters/notesMaster1.xml><?xml version="1.0" encoding="utf-8"?>
+<p:notesMaster xmlns:a="http://schemas.openxmlformats.org/drawingml/2006/main" xmlns:r="http://schemas.openxmlformats.org/officeDocument/2006/relationships" xmlns:p="http://schemas.openxmlformats.org/presentationml/2006/main">
+  <p:cSld>
+    <p:bg>
+      <p:bgRef idx="1001">
+        <a:schemeClr val="bg1"/>
+      </p:bgRef>
+    </p:bg>
+    <p:spTree>
+      <p:nvGrpSpPr>
+        <p:cNvPr id="1" name=""/>
+        <p:cNvGrpSpPr/>
+        <p:nvPr/>
+      </p:nvGrpSpPr>
+      <p:grpSpPr>
+        <a:xfrm>
+          <a:off x="0" y="0"/>
+          <a:ext cx="0" cy="0"/>
+          <a:chOff x="0" y="0"/>
+          <a:chExt cx="0" cy="0"/>
+        </a:xfrm>
+      </p:grpSpPr>
+      <p:sp>
+        <p:nvSpPr>
+          <p:cNvPr id="2" name="Header Placeholder 1"/>
+          <p:cNvSpPr>
+            <a:spLocks noGrp="1"/>
+          </p:cNvSpPr>
+          <p:nvPr>
+            <p:ph type="hdr" sz="quarter"/>
+          </p:nvPr>
+        </p:nvSpPr>
+        <p:spPr>
+          <a:xfrm>
+            <a:off x="0" y="0"/>
+            <a:ext cx="2971800" cy="458788"/>
+          </a:xfrm>
+          <a:prstGeom prst="rect">
+            <a:avLst/>
+          </a:prstGeom>
+        </p:spPr>
+        <p:txBody>
+          <a:bodyPr vert="horz" lIns="91440" tIns="45720" rIns="91440" bIns="45720" rtlCol="0"/>
+          <a:lstStyle>
+            <a:lvl1pPr algn="l">
+              <a:defRPr sz="1200"/>
+            </a:lvl1pPr>
+          </a:lstStyle>
+          <a:p>
+            <a:endParaRPr lang="en-US"/>
+          </a:p>
+        </p:txBody>
+      </p:sp>
+      <p:sp>
+        <p:nvSpPr>
+          <p:cNvPr id="3" name="Date Placeholder 2"/>
+          <p:cNvSpPr>
+            <a:spLocks noGrp="1"/>
+          </p:cNvSpPr>
+          <p:nvPr>
+            <p:ph type="dt" idx="1"/>
+          </p:nvPr>
+        </p:nvSpPr>
+        <p:spPr>
+          <a:xfrm>
+            <a:off x="3884613" y="0"/>
+            <a:ext cx="2971800" cy="458788"/>
+          </a:xfrm>
+          <a:prstGeom prst="rect">
+            <a:avLst/>
+          </a:prstGeom>
+        </p:spPr>
+        <p:txBody>
+          <a:bodyPr vert="horz" lIns="91440" tIns="45720" rIns="91440" bIns="45720" rtlCol="0"/>
+          <a:lstStyle>
+            <a:lvl1pPr algn="r">
+              <a:defRPr sz="1200"/>
+            </a:lvl1pPr>
+          </a:lstStyle>
+          <a:p>
+            <a:fld id="{19553C96-C507-48DD-9B82-D32AAE9F79FE}" type="datetimeFigureOut">
+              <a:rPr lang="en-US" smtClean="0"/>
+              <a:t>10/11/2021</a:t>
+            </a:fld>
+            <a:endParaRPr lang="en-US"/>
+          </a:p>
+        </p:txBody>
+      </p:sp>
+      <p:sp>
+        <p:nvSpPr>
+          <p:cNvPr id="4" name="Slide Image Placeholder 3"/>
+          <p:cNvSpPr>
+            <a:spLocks noGrp="1" noRot="1" noChangeAspect="1"/>
+          </p:cNvSpPr>
+          <p:nvPr>
+            <p:ph type="sldImg" idx="2"/>
+          </p:nvPr>
+        </p:nvSpPr>
+        <p:spPr>
+          <a:xfrm>
+            <a:off x="685800" y="1143000"/>
+            <a:ext cx="5486400" cy="3086100"/>
+          </a:xfrm>
+          <a:prstGeom prst="rect">
+            <a:avLst/>
+          </a:prstGeom>
+          <a:noFill/>
+          <a:ln w="12700">
+            <a:solidFill>
+              <a:prstClr val="black"/>
+            </a:solidFill>
+          </a:ln>
+        </p:spPr>
+        <p:txBody>
+          <a:bodyPr vert="horz" lIns="91440" tIns="45720" rIns="91440" bIns="45720" rtlCol="0" anchor="ctr"/>
+          <a:lstStyle/>
+          <a:p>
+            <a:endParaRPr lang="en-US"/>
+          </a:p>
+        </p:txBody>
+      </p:sp>
+      <p:sp>
+        <p:nvSpPr>
+          <p:cNvPr id="5" name="Notes Placeholder 4"/>
+          <p:cNvSpPr>
+            <a:spLocks noGrp="1"/>
+          </p:cNvSpPr>
+          <p:nvPr>
+            <p:ph type="body" sz="quarter" idx="3"/>
+          </p:nvPr>
+        </p:nvSpPr>
+        <p:spPr>
+          <a:xfrm>
+            <a:off x="685800" y="4400550"/>
+            <a:ext cx="5486400" cy="3600450"/>
+          </a:xfrm>
+          <a:prstGeom prst="rect">
+            <a:avLst/>
+          </a:prstGeom>
+        </p:spPr>
+        <p:txBody>
+          <a:bodyPr vert="horz" lIns="91440" tIns="45720" rIns="91440" bIns="45720" rtlCol="0"/>
+          <a:lstStyle/>
+          <a:p>
+            <a:pPr lvl="0"/>
+            <a:r>
+              <a:rPr lang="en-US"/>
+              <a:t>Click to edit Master text styles</a:t>
+            </a:r>
+          </a:p>
+          <a:p>
+            <a:pPr lvl="1"/>
+            <a:r>
+              <a:rPr lang="en-US"/>
+              <a:t>Second level</a:t>
+            </a:r>
+          </a:p>
+          <a:p>
+            <a:pPr lvl="2"/>
+            <a:r>
+              <a:rPr lang="en-US"/>
+              <a:t>Third level</a:t>
+            </a:r>
+          </a:p>
+          <a:p>
+            <a:pPr lvl="3"/>
+            <a:r>
+              <a:rPr lang="en-US"/>
+              <a:t>Fourth level</a:t>
+            </a:r>
+          </a:p>
+          <a:p>
+            <a:pPr lvl="4"/>
+            <a:r>
+              <a:rPr lang="en-US"/>
+              <a:t>Fifth level</a:t>
+            </a:r>
+          </a:p>
+        </p:txBody>
+      </p:sp>
+      <p:sp>
+        <p:nvSpPr>
+          <p:cNvPr id="6" name="Footer Placeholder 5"/>
+          <p:cNvSpPr>
+            <a:spLocks noGrp="1"/>
+          </p:cNvSpPr>
+          <p:nvPr>
+            <p:ph type="ftr" sz="quarter" idx="4"/>
+          </p:nvPr>
+        </p:nvSpPr>
+        <p:spPr>
+          <a:xfrm>
+            <a:off x="0" y="8685213"/>
+            <a:ext cx="2971800" cy="458787"/>
+          </a:xfrm>
+          <a:prstGeom prst="rect">
+            <a:avLst/>
+          </a:prstGeom>
+        </p:spPr>
+        <p:txBody>
+          <a:bodyPr vert="horz" lIns="91440" tIns="45720" rIns="91440" bIns="45720" rtlCol="0" anchor="b"/>
+          <a:lstStyle>
+            <a:lvl1pPr algn="l">
+              <a:defRPr sz="1200"/>
+            </a:lvl1pPr>
+          </a:lstStyle>
+          <a:p>
+            <a:endParaRPr lang="en-US"/>
+          </a:p>
+        </p:txBody>
+      </p:sp>
+      <p:sp>
+        <p:nvSpPr>
+          <p:cNvPr id="7" name="Slide Number Placeholder 6"/>
+          <p:cNvSpPr>
+            <a:spLocks noGrp="1"/>
+          </p:cNvSpPr>
+          <p:nvPr>
+            <p:ph type="sldNum" sz="quarter" idx="5"/>
+          </p:nvPr>
+        </p:nvSpPr>
+        <p:spPr>
+          <a:xfrm>
+            <a:off x="3884613" y="8685213"/>
+            <a:ext cx="2971800" cy="458787"/>
+          </a:xfrm>
+          <a:prstGeom prst="rect">
+            <a:avLst/>
+          </a:prstGeom>
+        </p:spPr>
+        <p:txBody>
+          <a:bodyPr vert="horz" lIns="91440" tIns="45720" rIns="91440" bIns="45720" rtlCol="0" anchor="b"/>
+          <a:lstStyle>
+            <a:lvl1pPr algn="r">
+              <a:defRPr sz="1200"/>
+            </a:lvl1pPr>
+          </a:lstStyle>
+          <a:p>
+            <a:fld id="{C3B036FF-7924-4268-A947-30CD2A6A0A22}" type="slidenum">
+              <a:rPr lang="en-US" smtClean="0"/>
+              <a:t>‹#›</a:t>
+            </a:fld>
+            <a:endParaRPr lang="en-US"/>
+          </a:p>
+        </p:txBody>
+      </p:sp>
+    </p:spTree>
+    <p:extLst>
+      <p:ext uri="{BB962C8B-B14F-4D97-AF65-F5344CB8AC3E}">
+        <p14:creationId xmlns:p14="http://schemas.microsoft.com/office/powerpoint/2010/main" val="2502514332"/>
+      </p:ext>
+    </p:extLst>
+  </p:cSld>
+  <p:clrMap bg1="lt1" tx1="dk1" bg2="lt2" tx2="dk2" accent1="accent1" accent2="accent2" accent3="accent3" accent4="accent4" accent5="accent5" accent6="accent6" hlink="hlink" folHlink="folHlink"/>
+  <p:notesStyle>
+    <a:lvl1pPr marL="0" algn="l" defTabSz="914400" rtl="0" eaLnBrk="1" latinLnBrk="0" hangingPunct="1">
+      <a:defRPr sz="1200" kern="1200">
+        <a:solidFill>
+          <a:schemeClr val="tx1"/>
+        </a:solidFill>
+        <a:latin typeface="+mn-lt"/>
+        <a:ea typeface="+mn-ea"/>
+        <a:cs typeface="+mn-cs"/>
+      </a:defRPr>
+    </a:lvl1pPr>
+    <a:lvl2pPr marL="457200" algn="l" defTabSz="914400" rtl="0" eaLnBrk="1" latinLnBrk="0" hangingPunct="1">
+      <a:defRPr sz="1200" kern="1200">
+        <a:solidFill>
+          <a:schemeClr val="tx1"/>
+        </a:solidFill>
+        <a:latin typeface="+mn-lt"/>
+        <a:ea typeface="+mn-ea"/>
+        <a:cs typeface="+mn-cs"/>
+      </a:defRPr>
+    </a:lvl2pPr>
+    <a:lvl3pPr marL="914400" algn="l" defTabSz="914400" rtl="0" eaLnBrk="1" latinLnBrk="0" hangingPunct="1">
+      <a:defRPr sz="1200" kern="1200">
+        <a:solidFill>
+          <a:schemeClr val="tx1"/>
+        </a:solidFill>
+        <a:latin typeface="+mn-lt"/>
+        <a:ea typeface="+mn-ea"/>
+        <a:cs typeface="+mn-cs"/>
+      </a:defRPr>
+    </a:lvl3pPr>
+    <a:lvl4pPr marL="1371600" algn="l" defTabSz="914400" rtl="0" eaLnBrk="1" latinLnBrk="0" hangingPunct="1">
+      <a:defRPr sz="1200" kern="1200">
+        <a:solidFill>
+          <a:schemeClr val="tx1"/>
+        </a:solidFill>
+        <a:latin typeface="+mn-lt"/>
+        <a:ea typeface="+mn-ea"/>
+        <a:cs typeface="+mn-cs"/>
+      </a:defRPr>
+    </a:lvl4pPr>
+    <a:lvl5pPr marL="1828800" algn="l" defTabSz="914400" rtl="0" eaLnBrk="1" latinLnBrk="0" hangingPunct="1">
+      <a:defRPr sz="1200" kern="1200">
+        <a:solidFill>
+          <a:schemeClr val="tx1"/>
+        </a:solidFill>
+        <a:latin typeface="+mn-lt"/>
+        <a:ea typeface="+mn-ea"/>
+        <a:cs typeface="+mn-cs"/>
+      </a:defRPr>
+    </a:lvl5pPr>
+    <a:lvl6pPr marL="2286000" algn="l" defTabSz="914400" rtl="0" eaLnBrk="1" latinLnBrk="0" hangingPunct="1">
+      <a:defRPr sz="1200" kern="1200">
+        <a:solidFill>
+          <a:schemeClr val="tx1"/>
+        </a:solidFill>
+        <a:latin typeface="+mn-lt"/>
+        <a:ea typeface="+mn-ea"/>
+        <a:cs typeface="+mn-cs"/>
+      </a:defRPr>
+    </a:lvl6pPr>
+    <a:lvl7pPr marL="2743200" algn="l" defTabSz="914400" rtl="0" eaLnBrk="1" latinLnBrk="0" hangingPunct="1">
+      <a:defRPr sz="1200" kern="1200">
+        <a:solidFill>
+          <a:schemeClr val="tx1"/>
+        </a:solidFill>
+        <a:latin typeface="+mn-lt"/>
+        <a:ea typeface="+mn-ea"/>
+        <a:cs typeface="+mn-cs"/>
+      </a:defRPr>
+    </a:lvl7pPr>
+    <a:lvl8pPr marL="3200400" algn="l" defTabSz="914400" rtl="0" eaLnBrk="1" latinLnBrk="0" hangingPunct="1">
+      <a:defRPr sz="1200" kern="1200">
+        <a:solidFill>
+          <a:schemeClr val="tx1"/>
+        </a:solidFill>
+        <a:latin typeface="+mn-lt"/>
+        <a:ea typeface="+mn-ea"/>
+        <a:cs typeface="+mn-cs"/>
+      </a:defRPr>
+    </a:lvl8pPr>
+    <a:lvl9pPr marL="3657600" algn="l" defTabSz="914400" rtl="0" eaLnBrk="1" latinLnBrk="0" hangingPunct="1">
+      <a:defRPr sz="1200" kern="1200">
+        <a:solidFill>
+          <a:schemeClr val="tx1"/>
+        </a:solidFill>
+        <a:latin typeface="+mn-lt"/>
+        <a:ea typeface="+mn-ea"/>
+        <a:cs typeface="+mn-cs"/>
+      </a:defRPr>
+    </a:lvl9pPr>
+  </p:notesStyle>
+</p:notesMaster>
 </file>
 
 <file path=ppt/slideLayouts/slideLayout1.xml><?xml version="1.0" encoding="utf-8"?>
@@ -4571,7 +4923,7 @@
           </a:bodyPr>
           <a:lstStyle/>
           <a:p>
-            <a:endParaRPr lang="en-US" sz="2200">
+            <a:endParaRPr lang="en-US" sz="2200" dirty="0">
               <a:solidFill>
                 <a:schemeClr val="bg1"/>
               </a:solidFill>
@@ -4872,28 +5224,28 @@
           <a:lstStyle/>
           <a:p>
             <a:r>
-              <a:rPr lang="en-US" sz="2200"/>
+              <a:rPr lang="en-US" sz="2200" dirty="0"/>
               <a:t>The maximum ABV is .128.</a:t>
             </a:r>
           </a:p>
           <a:p>
             <a:pPr lvl="1"/>
             <a:r>
-              <a:rPr lang="en-US" sz="2200"/>
+              <a:rPr lang="en-US" sz="2200" dirty="0"/>
               <a:t>Brewery : Upslope Brewing Company, Boulder, CO.</a:t>
             </a:r>
           </a:p>
           <a:p>
             <a:pPr lvl="1"/>
             <a:r>
-              <a:rPr lang="en-US" sz="2200"/>
+              <a:rPr lang="en-US" sz="2200" dirty="0"/>
               <a:t>Beer : Lee Hill Series Vol. 5 - Belgian Style Quadrupel Ale.</a:t>
             </a:r>
           </a:p>
           <a:p>
             <a:pPr lvl="1"/>
             <a:r>
-              <a:rPr lang="en-US" sz="2200"/>
+              <a:rPr lang="en-US" sz="2200" dirty="0"/>
               <a:t>Notes : This beer is of the Style ‘Quadrupel’ and has an IBU of 0.</a:t>
             </a:r>
           </a:p>
@@ -4901,32 +5253,32 @@
             <a:pPr marL="457200" lvl="1" indent="0">
               <a:buNone/>
             </a:pPr>
-            <a:endParaRPr lang="en-US" sz="2200"/>
-          </a:p>
-          <a:p>
-            <a:r>
-              <a:rPr lang="en-US" sz="2200"/>
+            <a:endParaRPr lang="en-US" sz="2200" dirty="0"/>
+          </a:p>
+          <a:p>
+            <a:r>
+              <a:rPr lang="en-US" sz="2200" dirty="0"/>
               <a:t>The maximum IBU is 138.</a:t>
             </a:r>
           </a:p>
           <a:p>
             <a:pPr lvl="1"/>
             <a:r>
-              <a:rPr lang="en-US" sz="2200"/>
+              <a:rPr lang="en-US" sz="2200" dirty="0"/>
               <a:t>Brewery : Astoria Brewing Company, Astoria, OR.</a:t>
             </a:r>
           </a:p>
           <a:p>
             <a:pPr lvl="1"/>
             <a:r>
-              <a:rPr lang="en-US" sz="2200"/>
+              <a:rPr lang="en-US" sz="2200" dirty="0"/>
               <a:t>Beer : Bitter Bitch Imperial IPA.</a:t>
             </a:r>
           </a:p>
           <a:p>
             <a:pPr lvl="1"/>
             <a:r>
-              <a:rPr lang="en-US" sz="2200"/>
+              <a:rPr lang="en-US" sz="2200" dirty="0"/>
               <a:t>Notes : This beer is of the Style ‘American Double / Imperial IPA’ and has an ABV of .082.</a:t>
             </a:r>
           </a:p>
@@ -4972,10 +5324,10 @@
       </p:grpSpPr>
       <p:sp>
         <p:nvSpPr>
-          <p:cNvPr id="20" name="Rectangle 19">
-            <a:extLst>
-              <a:ext uri="{FF2B5EF4-FFF2-40B4-BE49-F238E27FC236}">
-                <a16:creationId xmlns:a16="http://schemas.microsoft.com/office/drawing/2014/main" id="{AB45A142-4255-493C-8284-5D566C121B10}"/>
+          <p:cNvPr id="27" name="Rectangle 26">
+            <a:extLst>
+              <a:ext uri="{FF2B5EF4-FFF2-40B4-BE49-F238E27FC236}">
+                <a16:creationId xmlns:a16="http://schemas.microsoft.com/office/drawing/2014/main" id="{5E52985E-2553-471E-82AA-5ED7A329890A}"/>
               </a:ext>
               <a:ext uri="{C183D7F6-B498-43B3-948B-1728B52AA6E4}">
                 <adec:decorative xmlns:adec="http://schemas.microsoft.com/office/drawing/2017/decorative" val="1"/>
@@ -4995,22 +5347,24 @@
         </p:nvSpPr>
         <p:spPr bwMode="ltGray">
           <a:xfrm>
-            <a:off x="336884" y="321177"/>
-            <a:ext cx="4332307" cy="6179552"/>
+            <a:off x="393308" y="352931"/>
+            <a:ext cx="11438793" cy="1844256"/>
           </a:xfrm>
           <a:prstGeom prst="rect">
             <a:avLst/>
           </a:prstGeom>
           <a:solidFill>
-            <a:srgbClr val="404040">
-              <a:alpha val="89804"/>
-            </a:srgbClr>
+            <a:schemeClr val="tx1">
+              <a:lumMod val="75000"/>
+              <a:lumOff val="25000"/>
+            </a:schemeClr>
           </a:solidFill>
           <a:ln w="127000" cap="sq" cmpd="thinThick">
             <a:solidFill>
-              <a:srgbClr val="595959">
-                <a:alpha val="80000"/>
-              </a:srgbClr>
+              <a:schemeClr val="tx1">
+                <a:lumMod val="75000"/>
+                <a:lumOff val="25000"/>
+              </a:schemeClr>
             </a:solidFill>
           </a:ln>
         </p:spPr>
@@ -5034,8 +5388,37 @@
           <a:bodyPr rtlCol="0" anchor="ctr"/>
           <a:lstStyle/>
           <a:p>
-            <a:pPr algn="ctr"/>
-            <a:endParaRPr lang="en-US"/>
+            <a:pPr marL="0" marR="0" lvl="0" indent="0" algn="ctr" defTabSz="914400" rtl="0" eaLnBrk="1" fontAlgn="auto" latinLnBrk="0" hangingPunct="1">
+              <a:lnSpc>
+                <a:spcPct val="100000"/>
+              </a:lnSpc>
+              <a:spcBef>
+                <a:spcPts val="0"/>
+              </a:spcBef>
+              <a:spcAft>
+                <a:spcPts val="0"/>
+              </a:spcAft>
+              <a:buClrTx/>
+              <a:buSzTx/>
+              <a:buFontTx/>
+              <a:buNone/>
+              <a:tabLst/>
+              <a:defRPr/>
+            </a:pPr>
+            <a:endParaRPr kumimoji="0" lang="en-US" sz="1800" b="0" i="0" u="none" strike="noStrike" kern="1200" cap="none" spc="0" normalizeH="0" baseline="0" noProof="0">
+              <a:ln>
+                <a:noFill/>
+              </a:ln>
+              <a:solidFill>
+                <a:prstClr val="white"/>
+              </a:solidFill>
+              <a:effectLst/>
+              <a:uLnTx/>
+              <a:uFillTx/>
+              <a:latin typeface="Calibri" panose="020F0502020204030204"/>
+              <a:ea typeface="+mn-ea"/>
+              <a:cs typeface="+mn-cs"/>
+            </a:endParaRPr>
           </a:p>
         </p:txBody>
       </p:sp>
@@ -5057,25 +5440,22 @@
         </p:nvSpPr>
         <p:spPr>
           <a:xfrm>
-            <a:off x="674237" y="914400"/>
-            <a:ext cx="3657600" cy="2887579"/>
+            <a:off x="649270" y="506727"/>
+            <a:ext cx="3885141" cy="1526741"/>
           </a:xfrm>
         </p:spPr>
         <p:txBody>
-          <a:bodyPr vert="horz" lIns="91440" tIns="45720" rIns="91440" bIns="45720" rtlCol="0" anchor="b">
+          <a:bodyPr vert="horz" lIns="91440" tIns="45720" rIns="91440" bIns="45720" rtlCol="0" anchor="ctr">
             <a:normAutofit/>
           </a:bodyPr>
           <a:lstStyle/>
           <a:p>
-            <a:pPr algn="ctr"/>
-            <a:r>
-              <a:rPr lang="en-US" sz="4800" kern="1200">
+            <a:pPr algn="r"/>
+            <a:r>
+              <a:rPr lang="en-US" sz="3000" dirty="0">
                 <a:solidFill>
-                  <a:srgbClr val="FFFFFF"/>
+                  <a:schemeClr val="bg1"/>
                 </a:solidFill>
-                <a:latin typeface="+mj-lt"/>
-                <a:ea typeface="+mj-ea"/>
-                <a:cs typeface="+mj-cs"/>
               </a:rPr>
               <a:t>ABV Distribution</a:t>
             </a:r>
@@ -5084,10 +5464,10 @@
       </p:sp>
       <p:cxnSp>
         <p:nvCxnSpPr>
-          <p:cNvPr id="22" name="Straight Connector 21">
-            <a:extLst>
-              <a:ext uri="{FF2B5EF4-FFF2-40B4-BE49-F238E27FC236}">
-                <a16:creationId xmlns:a16="http://schemas.microsoft.com/office/drawing/2014/main" id="{38FB9660-F42F-4313-BBC4-47C007FE484C}"/>
+          <p:cNvPr id="29" name="Straight Connector 28">
+            <a:extLst>
+              <a:ext uri="{FF2B5EF4-FFF2-40B4-BE49-F238E27FC236}">
+                <a16:creationId xmlns:a16="http://schemas.microsoft.com/office/drawing/2014/main" id="{DAE3ABC6-4042-4293-A7DF-F01181363B7E}"/>
               </a:ext>
               <a:ext uri="{C183D7F6-B498-43B3-948B-1728B52AA6E4}">
                 <adec:decorative xmlns:adec="http://schemas.microsoft.com/office/drawing/2017/decorative" val="1"/>
@@ -5106,16 +5486,18 @@
           </p:nvPr>
         </p:nvCxnSpPr>
         <p:spPr>
-          <a:xfrm>
-            <a:off x="1191126" y="3910267"/>
-            <a:ext cx="2586790" cy="0"/>
+          <a:xfrm flipV="1">
+            <a:off x="4739873" y="580963"/>
+            <a:ext cx="0" cy="1371600"/>
           </a:xfrm>
           <a:prstGeom prst="line">
             <a:avLst/>
           </a:prstGeom>
-          <a:ln w="22225">
+          <a:ln w="19050">
             <a:solidFill>
-              <a:srgbClr val="D9D9D9"/>
+              <a:schemeClr val="bg1">
+                <a:alpha val="75000"/>
+              </a:schemeClr>
             </a:solidFill>
           </a:ln>
         </p:spPr>
@@ -5134,12 +5516,117 @@
           </a:fontRef>
         </p:style>
       </p:cxnSp>
+      <p:sp>
+        <p:nvSpPr>
+          <p:cNvPr id="6" name="TextBox 5">
+            <a:extLst>
+              <a:ext uri="{FF2B5EF4-FFF2-40B4-BE49-F238E27FC236}">
+                <a16:creationId xmlns:a16="http://schemas.microsoft.com/office/drawing/2014/main" id="{ED1FFA1F-B23F-4082-ABD3-D20ADEF58886}"/>
+              </a:ext>
+            </a:extLst>
+          </p:cNvPr>
+          <p:cNvSpPr txBox="1"/>
+          <p:nvPr/>
+        </p:nvSpPr>
+        <p:spPr>
+          <a:xfrm>
+            <a:off x="4945336" y="506727"/>
+            <a:ext cx="6609921" cy="1526741"/>
+          </a:xfrm>
+          <a:prstGeom prst="rect">
+            <a:avLst/>
+          </a:prstGeom>
+        </p:spPr>
+        <p:txBody>
+          <a:bodyPr vert="horz" lIns="91440" tIns="45720" rIns="91440" bIns="45720" rtlCol="0" anchor="t">
+            <a:normAutofit lnSpcReduction="10000"/>
+          </a:bodyPr>
+          <a:lstStyle/>
+          <a:p>
+            <a:pPr indent="-228600">
+              <a:lnSpc>
+                <a:spcPct val="90000"/>
+              </a:lnSpc>
+              <a:spcAft>
+                <a:spcPts val="600"/>
+              </a:spcAft>
+              <a:buFont typeface="Arial" panose="020B0604020202020204" pitchFamily="34" charset="0"/>
+              <a:buChar char="•"/>
+            </a:pPr>
+            <a:r>
+              <a:rPr lang="en-US" sz="2200" dirty="0">
+                <a:solidFill>
+                  <a:schemeClr val="bg1"/>
+                </a:solidFill>
+              </a:rPr>
+              <a:t>The ABV distribution is skewed right.</a:t>
+            </a:r>
+          </a:p>
+          <a:p>
+            <a:pPr lvl="1" indent="-228600">
+              <a:lnSpc>
+                <a:spcPct val="90000"/>
+              </a:lnSpc>
+              <a:spcAft>
+                <a:spcPts val="600"/>
+              </a:spcAft>
+              <a:buFont typeface="Arial" panose="020B0604020202020204" pitchFamily="34" charset="0"/>
+              <a:buChar char="•"/>
+            </a:pPr>
+            <a:r>
+              <a:rPr lang="en-US" sz="1700" dirty="0">
+                <a:solidFill>
+                  <a:schemeClr val="bg1"/>
+                </a:solidFill>
+              </a:rPr>
+              <a:t>While there are ~50 beers at ABV=0, there is a long tail of high-ABV beers.</a:t>
+            </a:r>
+          </a:p>
+          <a:p>
+            <a:pPr lvl="1" indent="-228600">
+              <a:lnSpc>
+                <a:spcPct val="90000"/>
+              </a:lnSpc>
+              <a:spcAft>
+                <a:spcPts val="600"/>
+              </a:spcAft>
+              <a:buFont typeface="Arial" panose="020B0604020202020204" pitchFamily="34" charset="0"/>
+              <a:buChar char="•"/>
+            </a:pPr>
+            <a:r>
+              <a:rPr lang="en-US" sz="1700" dirty="0">
+                <a:solidFill>
+                  <a:schemeClr val="bg1"/>
+                </a:solidFill>
+              </a:rPr>
+              <a:t>The Shapiro-Wilke Normality Test gives us a p-value of &lt;2.2e-16. This supports the conclusion of non-normality.</a:t>
+            </a:r>
+          </a:p>
+          <a:p>
+            <a:pPr indent="-228600">
+              <a:lnSpc>
+                <a:spcPct val="90000"/>
+              </a:lnSpc>
+              <a:spcAft>
+                <a:spcPts val="600"/>
+              </a:spcAft>
+              <a:buFont typeface="Arial" panose="020B0604020202020204" pitchFamily="34" charset="0"/>
+              <a:buChar char="•"/>
+            </a:pPr>
+            <a:endParaRPr lang="en-US" sz="2200" dirty="0">
+              <a:solidFill>
+                <a:schemeClr val="bg1"/>
+              </a:solidFill>
+            </a:endParaRPr>
+          </a:p>
+        </p:txBody>
+      </p:sp>
       <p:pic>
         <p:nvPicPr>
-          <p:cNvPr id="4" name="Picture 3" descr="Chart, bar chart, histogram&#10;&#10;Description automatically generated">
-            <a:extLst>
-              <a:ext uri="{FF2B5EF4-FFF2-40B4-BE49-F238E27FC236}">
-                <a16:creationId xmlns:a16="http://schemas.microsoft.com/office/drawing/2014/main" id="{6F397130-4A77-4FA4-A171-95B2129F400E}"/>
+          <p:cNvPr id="5" name="Picture 4" descr="Chart, bar chart, histogram&#10;&#10;Description automatically generated">
+            <a:extLst>
+              <a:ext uri="{FF2B5EF4-FFF2-40B4-BE49-F238E27FC236}">
+                <a16:creationId xmlns:a16="http://schemas.microsoft.com/office/drawing/2014/main" id="{3A09E736-D7A4-4783-98D4-09BB08CE0C9F}"/>
               </a:ext>
             </a:extLst>
           </p:cNvPr>
@@ -5156,8 +5643,38 @@
         </p:blipFill>
         <p:spPr>
           <a:xfrm>
-            <a:off x="5186079" y="419537"/>
-            <a:ext cx="6553545" cy="4046813"/>
+            <a:off x="393308" y="2439566"/>
+            <a:ext cx="5559480" cy="3432978"/>
+          </a:xfrm>
+          <a:prstGeom prst="rect">
+            <a:avLst/>
+          </a:prstGeom>
+        </p:spPr>
+      </p:pic>
+      <p:pic>
+        <p:nvPicPr>
+          <p:cNvPr id="8" name="Picture 7" descr="Chart, line chart&#10;&#10;Description automatically generated">
+            <a:extLst>
+              <a:ext uri="{FF2B5EF4-FFF2-40B4-BE49-F238E27FC236}">
+                <a16:creationId xmlns:a16="http://schemas.microsoft.com/office/drawing/2014/main" id="{5285A350-421F-4A63-95B4-34F43214E5A5}"/>
+              </a:ext>
+            </a:extLst>
+          </p:cNvPr>
+          <p:cNvPicPr>
+            <a:picLocks noChangeAspect="1"/>
+          </p:cNvPicPr>
+          <p:nvPr/>
+        </p:nvPicPr>
+        <p:blipFill>
+          <a:blip r:embed="rId3"/>
+          <a:stretch>
+            <a:fillRect/>
+          </a:stretch>
+        </p:blipFill>
+        <p:spPr>
+          <a:xfrm>
+            <a:off x="6251737" y="2525961"/>
+            <a:ext cx="5546955" cy="3425244"/>
           </a:xfrm>
           <a:prstGeom prst="rect">
             <a:avLst/>
@@ -5166,10 +5683,10 @@
       </p:pic>
       <p:graphicFrame>
         <p:nvGraphicFramePr>
-          <p:cNvPr id="12" name="Table 11">
-            <a:extLst>
-              <a:ext uri="{FF2B5EF4-FFF2-40B4-BE49-F238E27FC236}">
-                <a16:creationId xmlns:a16="http://schemas.microsoft.com/office/drawing/2014/main" id="{C606F1B7-F18D-4181-95B5-10ACF2AEAA58}"/>
+          <p:cNvPr id="15" name="Table 14">
+            <a:extLst>
+              <a:ext uri="{FF2B5EF4-FFF2-40B4-BE49-F238E27FC236}">
+                <a16:creationId xmlns:a16="http://schemas.microsoft.com/office/drawing/2014/main" id="{3B62F764-3880-49ED-8C95-A01D00B7EB95}"/>
               </a:ext>
             </a:extLst>
           </p:cNvPr>
@@ -5179,13 +5696,13 @@
           <p:nvPr>
             <p:extLst>
               <p:ext uri="{D42A27DB-BD31-4B8C-83A1-F6EECF244321}">
-                <p14:modId xmlns:p14="http://schemas.microsoft.com/office/powerpoint/2010/main" val="3806364622"/>
+                <p14:modId xmlns:p14="http://schemas.microsoft.com/office/powerpoint/2010/main" val="905084121"/>
               </p:ext>
             </p:extLst>
           </p:nvPr>
         </p:nvGraphicFramePr>
         <p:xfrm>
-          <a:off x="5000177" y="4610071"/>
+          <a:off x="2633326" y="5980433"/>
           <a:ext cx="6925348" cy="741680"/>
         </p:xfrm>
         <a:graphic>
@@ -5566,485 +6083,6 @@
           </a:graphicData>
         </a:graphic>
       </p:graphicFrame>
-      <p:graphicFrame>
-        <p:nvGraphicFramePr>
-          <p:cNvPr id="7" name="Table 6">
-            <a:extLst>
-              <a:ext uri="{FF2B5EF4-FFF2-40B4-BE49-F238E27FC236}">
-                <a16:creationId xmlns:a16="http://schemas.microsoft.com/office/drawing/2014/main" id="{4297668C-2186-4E9D-B92C-48135954A462}"/>
-              </a:ext>
-            </a:extLst>
-          </p:cNvPr>
-          <p:cNvGraphicFramePr>
-            <a:graphicFrameLocks noGrp="1"/>
-          </p:cNvGraphicFramePr>
-          <p:nvPr>
-            <p:extLst>
-              <p:ext uri="{D42A27DB-BD31-4B8C-83A1-F6EECF244321}">
-                <p14:modId xmlns:p14="http://schemas.microsoft.com/office/powerpoint/2010/main" val="3705015380"/>
-              </p:ext>
-            </p:extLst>
-          </p:nvPr>
-        </p:nvGraphicFramePr>
-        <p:xfrm>
-          <a:off x="5000177" y="5837044"/>
-          <a:ext cx="6925348" cy="741680"/>
-        </p:xfrm>
-        <a:graphic>
-          <a:graphicData uri="http://schemas.openxmlformats.org/drawingml/2006/table">
-            <a:tbl>
-              <a:tblPr firstRow="1" bandRow="1">
-                <a:tableStyleId>{93296810-A885-4BE3-A3E7-6D5BEEA58F35}</a:tableStyleId>
-              </a:tblPr>
-              <a:tblGrid>
-                <a:gridCol w="697449">
-                  <a:extLst>
-                    <a:ext uri="{9D8B030D-6E8A-4147-A177-3AD203B41FA5}">
-                      <a16:colId xmlns:a16="http://schemas.microsoft.com/office/drawing/2014/main" val="819411853"/>
-                    </a:ext>
-                  </a:extLst>
-                </a:gridCol>
-                <a:gridCol w="1264013">
-                  <a:extLst>
-                    <a:ext uri="{9D8B030D-6E8A-4147-A177-3AD203B41FA5}">
-                      <a16:colId xmlns:a16="http://schemas.microsoft.com/office/drawing/2014/main" val="3496864432"/>
-                    </a:ext>
-                  </a:extLst>
-                </a:gridCol>
-                <a:gridCol w="1038154">
-                  <a:extLst>
-                    <a:ext uri="{9D8B030D-6E8A-4147-A177-3AD203B41FA5}">
-                      <a16:colId xmlns:a16="http://schemas.microsoft.com/office/drawing/2014/main" val="548960430"/>
-                    </a:ext>
-                  </a:extLst>
-                </a:gridCol>
-                <a:gridCol w="886899">
-                  <a:extLst>
-                    <a:ext uri="{9D8B030D-6E8A-4147-A177-3AD203B41FA5}">
-                      <a16:colId xmlns:a16="http://schemas.microsoft.com/office/drawing/2014/main" val="1352677794"/>
-                    </a:ext>
-                  </a:extLst>
-                </a:gridCol>
-                <a:gridCol w="983152">
-                  <a:extLst>
-                    <a:ext uri="{9D8B030D-6E8A-4147-A177-3AD203B41FA5}">
-                      <a16:colId xmlns:a16="http://schemas.microsoft.com/office/drawing/2014/main" val="2609831439"/>
-                    </a:ext>
-                  </a:extLst>
-                </a:gridCol>
-                <a:gridCol w="1423164">
-                  <a:extLst>
-                    <a:ext uri="{9D8B030D-6E8A-4147-A177-3AD203B41FA5}">
-                      <a16:colId xmlns:a16="http://schemas.microsoft.com/office/drawing/2014/main" val="4294260443"/>
-                    </a:ext>
-                  </a:extLst>
-                </a:gridCol>
-                <a:gridCol w="632517">
-                  <a:extLst>
-                    <a:ext uri="{9D8B030D-6E8A-4147-A177-3AD203B41FA5}">
-                      <a16:colId xmlns:a16="http://schemas.microsoft.com/office/drawing/2014/main" val="1610410939"/>
-                    </a:ext>
-                  </a:extLst>
-                </a:gridCol>
-              </a:tblGrid>
-              <a:tr h="370840">
-                <a:tc>
-                  <a:txBody>
-                    <a:bodyPr/>
-                    <a:lstStyle/>
-                    <a:p>
-                      <a:pPr algn="ctr"/>
-                      <a:r>
-                        <a:rPr lang="en-US" sz="1600" dirty="0"/>
-                        <a:t>Min</a:t>
-                      </a:r>
-                    </a:p>
-                  </a:txBody>
-                  <a:tcPr>
-                    <a:solidFill>
-                      <a:schemeClr val="accent6">
-                        <a:lumMod val="60000"/>
-                        <a:lumOff val="40000"/>
-                      </a:schemeClr>
-                    </a:solidFill>
-                  </a:tcPr>
-                </a:tc>
-                <a:tc>
-                  <a:txBody>
-                    <a:bodyPr/>
-                    <a:lstStyle/>
-                    <a:p>
-                      <a:pPr algn="ctr"/>
-                      <a:r>
-                        <a:rPr lang="en-US" sz="1600" dirty="0"/>
-                        <a:t>1</a:t>
-                      </a:r>
-                      <a:r>
-                        <a:rPr lang="en-US" sz="1600" baseline="30000" dirty="0"/>
-                        <a:t>st</a:t>
-                      </a:r>
-                      <a:r>
-                        <a:rPr lang="en-US" sz="1600" dirty="0"/>
-                        <a:t> Quartile</a:t>
-                      </a:r>
-                    </a:p>
-                  </a:txBody>
-                  <a:tcPr>
-                    <a:solidFill>
-                      <a:schemeClr val="accent6">
-                        <a:lumMod val="60000"/>
-                        <a:lumOff val="40000"/>
-                      </a:schemeClr>
-                    </a:solidFill>
-                  </a:tcPr>
-                </a:tc>
-                <a:tc>
-                  <a:txBody>
-                    <a:bodyPr/>
-                    <a:lstStyle/>
-                    <a:p>
-                      <a:pPr algn="ctr"/>
-                      <a:r>
-                        <a:rPr lang="en-US" sz="1600" dirty="0"/>
-                        <a:t>Median</a:t>
-                      </a:r>
-                    </a:p>
-                  </a:txBody>
-                  <a:tcPr>
-                    <a:solidFill>
-                      <a:schemeClr val="accent6">
-                        <a:lumMod val="60000"/>
-                        <a:lumOff val="40000"/>
-                      </a:schemeClr>
-                    </a:solidFill>
-                  </a:tcPr>
-                </a:tc>
-                <a:tc>
-                  <a:txBody>
-                    <a:bodyPr/>
-                    <a:lstStyle/>
-                    <a:p>
-                      <a:pPr algn="ctr"/>
-                      <a:r>
-                        <a:rPr lang="en-US" sz="1600" dirty="0"/>
-                        <a:t>Mean</a:t>
-                      </a:r>
-                    </a:p>
-                  </a:txBody>
-                  <a:tcPr>
-                    <a:solidFill>
-                      <a:schemeClr val="accent6">
-                        <a:lumMod val="60000"/>
-                        <a:lumOff val="40000"/>
-                      </a:schemeClr>
-                    </a:solidFill>
-                  </a:tcPr>
-                </a:tc>
-                <a:tc>
-                  <a:txBody>
-                    <a:bodyPr/>
-                    <a:lstStyle/>
-                    <a:p>
-                      <a:pPr algn="ctr"/>
-                      <a:r>
-                        <a:rPr lang="en-US" sz="1600" dirty="0"/>
-                        <a:t>St. Dev.</a:t>
-                      </a:r>
-                    </a:p>
-                  </a:txBody>
-                  <a:tcPr>
-                    <a:solidFill>
-                      <a:schemeClr val="accent6">
-                        <a:lumMod val="60000"/>
-                        <a:lumOff val="40000"/>
-                      </a:schemeClr>
-                    </a:solidFill>
-                  </a:tcPr>
-                </a:tc>
-                <a:tc>
-                  <a:txBody>
-                    <a:bodyPr/>
-                    <a:lstStyle/>
-                    <a:p>
-                      <a:pPr algn="ctr"/>
-                      <a:r>
-                        <a:rPr lang="en-US" sz="1600" dirty="0"/>
-                        <a:t>3</a:t>
-                      </a:r>
-                      <a:r>
-                        <a:rPr lang="en-US" sz="1600" baseline="30000" dirty="0"/>
-                        <a:t>rd</a:t>
-                      </a:r>
-                      <a:r>
-                        <a:rPr lang="en-US" sz="1600" dirty="0"/>
-                        <a:t> Quartile</a:t>
-                      </a:r>
-                    </a:p>
-                  </a:txBody>
-                  <a:tcPr>
-                    <a:solidFill>
-                      <a:schemeClr val="accent6">
-                        <a:lumMod val="60000"/>
-                        <a:lumOff val="40000"/>
-                      </a:schemeClr>
-                    </a:solidFill>
-                  </a:tcPr>
-                </a:tc>
-                <a:tc>
-                  <a:txBody>
-                    <a:bodyPr/>
-                    <a:lstStyle/>
-                    <a:p>
-                      <a:pPr algn="ctr"/>
-                      <a:r>
-                        <a:rPr lang="en-US" sz="1600" dirty="0"/>
-                        <a:t>Max</a:t>
-                      </a:r>
-                    </a:p>
-                  </a:txBody>
-                  <a:tcPr>
-                    <a:solidFill>
-                      <a:schemeClr val="accent6">
-                        <a:lumMod val="60000"/>
-                        <a:lumOff val="40000"/>
-                      </a:schemeClr>
-                    </a:solidFill>
-                  </a:tcPr>
-                </a:tc>
-                <a:extLst>
-                  <a:ext uri="{0D108BD9-81ED-4DB2-BD59-A6C34878D82A}">
-                    <a16:rowId xmlns:a16="http://schemas.microsoft.com/office/drawing/2014/main" val="3122196041"/>
-                  </a:ext>
-                </a:extLst>
-              </a:tr>
-              <a:tr h="370840">
-                <a:tc>
-                  <a:txBody>
-                    <a:bodyPr/>
-                    <a:lstStyle/>
-                    <a:p>
-                      <a:pPr algn="ctr"/>
-                      <a:r>
-                        <a:rPr lang="en-US" dirty="0"/>
-                        <a:t>.001</a:t>
-                      </a:r>
-                    </a:p>
-                  </a:txBody>
-                  <a:tcPr>
-                    <a:solidFill>
-                      <a:schemeClr val="accent6">
-                        <a:lumMod val="20000"/>
-                        <a:lumOff val="80000"/>
-                      </a:schemeClr>
-                    </a:solidFill>
-                  </a:tcPr>
-                </a:tc>
-                <a:tc>
-                  <a:txBody>
-                    <a:bodyPr/>
-                    <a:lstStyle/>
-                    <a:p>
-                      <a:pPr algn="ctr"/>
-                      <a:r>
-                        <a:rPr lang="en-US" dirty="0"/>
-                        <a:t>.05</a:t>
-                      </a:r>
-                    </a:p>
-                  </a:txBody>
-                  <a:tcPr>
-                    <a:solidFill>
-                      <a:schemeClr val="accent6">
-                        <a:lumMod val="20000"/>
-                        <a:lumOff val="80000"/>
-                      </a:schemeClr>
-                    </a:solidFill>
-                  </a:tcPr>
-                </a:tc>
-                <a:tc>
-                  <a:txBody>
-                    <a:bodyPr/>
-                    <a:lstStyle/>
-                    <a:p>
-                      <a:pPr algn="ctr"/>
-                      <a:r>
-                        <a:rPr lang="en-US" dirty="0"/>
-                        <a:t>.056</a:t>
-                      </a:r>
-                    </a:p>
-                  </a:txBody>
-                  <a:tcPr>
-                    <a:solidFill>
-                      <a:schemeClr val="accent6">
-                        <a:lumMod val="20000"/>
-                        <a:lumOff val="80000"/>
-                      </a:schemeClr>
-                    </a:solidFill>
-                  </a:tcPr>
-                </a:tc>
-                <a:tc>
-                  <a:txBody>
-                    <a:bodyPr/>
-                    <a:lstStyle/>
-                    <a:p>
-                      <a:pPr algn="ctr"/>
-                      <a:r>
-                        <a:rPr lang="en-US" dirty="0"/>
-                        <a:t>.06</a:t>
-                      </a:r>
-                    </a:p>
-                  </a:txBody>
-                  <a:tcPr>
-                    <a:solidFill>
-                      <a:schemeClr val="accent6">
-                        <a:lumMod val="20000"/>
-                        <a:lumOff val="80000"/>
-                      </a:schemeClr>
-                    </a:solidFill>
-                  </a:tcPr>
-                </a:tc>
-                <a:tc>
-                  <a:txBody>
-                    <a:bodyPr/>
-                    <a:lstStyle/>
-                    <a:p>
-                      <a:pPr algn="ctr"/>
-                      <a:r>
-                        <a:rPr lang="en-US" dirty="0"/>
-                        <a:t>.014</a:t>
-                      </a:r>
-                    </a:p>
-                  </a:txBody>
-                  <a:tcPr>
-                    <a:solidFill>
-                      <a:schemeClr val="accent6">
-                        <a:lumMod val="20000"/>
-                        <a:lumOff val="80000"/>
-                      </a:schemeClr>
-                    </a:solidFill>
-                  </a:tcPr>
-                </a:tc>
-                <a:tc>
-                  <a:txBody>
-                    <a:bodyPr/>
-                    <a:lstStyle/>
-                    <a:p>
-                      <a:pPr algn="ctr"/>
-                      <a:r>
-                        <a:rPr lang="en-US" dirty="0"/>
-                        <a:t>.067</a:t>
-                      </a:r>
-                    </a:p>
-                  </a:txBody>
-                  <a:tcPr>
-                    <a:solidFill>
-                      <a:schemeClr val="accent6">
-                        <a:lumMod val="20000"/>
-                        <a:lumOff val="80000"/>
-                      </a:schemeClr>
-                    </a:solidFill>
-                  </a:tcPr>
-                </a:tc>
-                <a:tc>
-                  <a:txBody>
-                    <a:bodyPr/>
-                    <a:lstStyle/>
-                    <a:p>
-                      <a:pPr algn="ctr"/>
-                      <a:r>
-                        <a:rPr lang="en-US" dirty="0"/>
-                        <a:t>.128</a:t>
-                      </a:r>
-                    </a:p>
-                  </a:txBody>
-                  <a:tcPr>
-                    <a:solidFill>
-                      <a:schemeClr val="accent6">
-                        <a:lumMod val="20000"/>
-                        <a:lumOff val="80000"/>
-                      </a:schemeClr>
-                    </a:solidFill>
-                  </a:tcPr>
-                </a:tc>
-                <a:extLst>
-                  <a:ext uri="{0D108BD9-81ED-4DB2-BD59-A6C34878D82A}">
-                    <a16:rowId xmlns:a16="http://schemas.microsoft.com/office/drawing/2014/main" val="523112149"/>
-                  </a:ext>
-                </a:extLst>
-              </a:tr>
-            </a:tbl>
-          </a:graphicData>
-        </a:graphic>
-      </p:graphicFrame>
-      <p:sp>
-        <p:nvSpPr>
-          <p:cNvPr id="3" name="TextBox 2">
-            <a:extLst>
-              <a:ext uri="{FF2B5EF4-FFF2-40B4-BE49-F238E27FC236}">
-                <a16:creationId xmlns:a16="http://schemas.microsoft.com/office/drawing/2014/main" id="{1FF5C6B4-8825-4D6B-A75A-C1AF7C5BACD6}"/>
-              </a:ext>
-            </a:extLst>
-          </p:cNvPr>
-          <p:cNvSpPr txBox="1"/>
-          <p:nvPr/>
-        </p:nvSpPr>
-        <p:spPr>
-          <a:xfrm>
-            <a:off x="4954380" y="4311916"/>
-            <a:ext cx="1443789" cy="338554"/>
-          </a:xfrm>
-          <a:prstGeom prst="rect">
-            <a:avLst/>
-          </a:prstGeom>
-          <a:noFill/>
-        </p:spPr>
-        <p:txBody>
-          <a:bodyPr wrap="square" rtlCol="0">
-            <a:spAutoFit/>
-          </a:bodyPr>
-          <a:lstStyle/>
-          <a:p>
-            <a:r>
-              <a:rPr lang="en-US" sz="1600" b="1" dirty="0"/>
-              <a:t>Full Dataset</a:t>
-            </a:r>
-          </a:p>
-        </p:txBody>
-      </p:sp>
-      <p:sp>
-        <p:nvSpPr>
-          <p:cNvPr id="9" name="TextBox 8">
-            <a:extLst>
-              <a:ext uri="{FF2B5EF4-FFF2-40B4-BE49-F238E27FC236}">
-                <a16:creationId xmlns:a16="http://schemas.microsoft.com/office/drawing/2014/main" id="{6AB1E4BF-F502-46DC-ABF6-3E107FFF028D}"/>
-              </a:ext>
-            </a:extLst>
-          </p:cNvPr>
-          <p:cNvSpPr txBox="1"/>
-          <p:nvPr/>
-        </p:nvSpPr>
-        <p:spPr>
-          <a:xfrm>
-            <a:off x="5000177" y="5551132"/>
-            <a:ext cx="1628742" cy="338554"/>
-          </a:xfrm>
-          <a:prstGeom prst="rect">
-            <a:avLst/>
-          </a:prstGeom>
-          <a:noFill/>
-        </p:spPr>
-        <p:txBody>
-          <a:bodyPr wrap="square" rtlCol="0">
-            <a:spAutoFit/>
-          </a:bodyPr>
-          <a:lstStyle/>
-          <a:p>
-            <a:r>
-              <a:rPr lang="en-US" sz="1600" b="1" dirty="0"/>
-              <a:t>Alcoholic Only</a:t>
-            </a:r>
-          </a:p>
-        </p:txBody>
-      </p:sp>
     </p:spTree>
     <p:extLst>
       <p:ext uri="{BB962C8B-B14F-4D97-AF65-F5344CB8AC3E}">
@@ -7056,4 +7094,299 @@
     </a:ext>
   </a:extLst>
 </a:theme>
+</file>
+
+<file path=ppt/theme/theme2.xml><?xml version="1.0" encoding="utf-8"?>
+<a:theme xmlns:a="http://schemas.openxmlformats.org/drawingml/2006/main" name="Office Theme">
+  <a:themeElements>
+    <a:clrScheme name="Office">
+      <a:dk1>
+        <a:sysClr val="windowText" lastClr="000000"/>
+      </a:dk1>
+      <a:lt1>
+        <a:sysClr val="window" lastClr="FFFFFF"/>
+      </a:lt1>
+      <a:dk2>
+        <a:srgbClr val="44546A"/>
+      </a:dk2>
+      <a:lt2>
+        <a:srgbClr val="E7E6E6"/>
+      </a:lt2>
+      <a:accent1>
+        <a:srgbClr val="4472C4"/>
+      </a:accent1>
+      <a:accent2>
+        <a:srgbClr val="ED7D31"/>
+      </a:accent2>
+      <a:accent3>
+        <a:srgbClr val="A5A5A5"/>
+      </a:accent3>
+      <a:accent4>
+        <a:srgbClr val="FFC000"/>
+      </a:accent4>
+      <a:accent5>
+        <a:srgbClr val="5B9BD5"/>
+      </a:accent5>
+      <a:accent6>
+        <a:srgbClr val="70AD47"/>
+      </a:accent6>
+      <a:hlink>
+        <a:srgbClr val="0563C1"/>
+      </a:hlink>
+      <a:folHlink>
+        <a:srgbClr val="954F72"/>
+      </a:folHlink>
+    </a:clrScheme>
+    <a:fontScheme name="Office">
+      <a:majorFont>
+        <a:latin typeface="Calibri Light" panose="020F0302020204030204"/>
+        <a:ea typeface=""/>
+        <a:cs typeface=""/>
+        <a:font script="Jpan" typeface="游ゴシック Light"/>
+        <a:font script="Hang" typeface="맑은 고딕"/>
+        <a:font script="Hans" typeface="等线 Light"/>
+        <a:font script="Hant" typeface="新細明體"/>
+        <a:font script="Arab" typeface="Times New Roman"/>
+        <a:font script="Hebr" typeface="Times New Roman"/>
+        <a:font script="Thai" typeface="Angsana New"/>
+        <a:font script="Ethi" typeface="Nyala"/>
+        <a:font script="Beng" typeface="Vrinda"/>
+        <a:font script="Gujr" typeface="Shruti"/>
+        <a:font script="Khmr" typeface="MoolBoran"/>
+        <a:font script="Knda" typeface="Tunga"/>
+        <a:font script="Guru" typeface="Raavi"/>
+        <a:font script="Cans" typeface="Euphemia"/>
+        <a:font script="Cher" typeface="Plantagenet Cherokee"/>
+        <a:font script="Yiii" typeface="Microsoft Yi Baiti"/>
+        <a:font script="Tibt" typeface="Microsoft Himalaya"/>
+        <a:font script="Thaa" typeface="MV Boli"/>
+        <a:font script="Deva" typeface="Mangal"/>
+        <a:font script="Telu" typeface="Gautami"/>
+        <a:font script="Taml" typeface="Latha"/>
+        <a:font script="Syrc" typeface="Estrangelo Edessa"/>
+        <a:font script="Orya" typeface="Kalinga"/>
+        <a:font script="Mlym" typeface="Kartika"/>
+        <a:font script="Laoo" typeface="DokChampa"/>
+        <a:font script="Sinh" typeface="Iskoola Pota"/>
+        <a:font script="Mong" typeface="Mongolian Baiti"/>
+        <a:font script="Viet" typeface="Times New Roman"/>
+        <a:font script="Uigh" typeface="Microsoft Uighur"/>
+        <a:font script="Geor" typeface="Sylfaen"/>
+        <a:font script="Armn" typeface="Arial"/>
+        <a:font script="Bugi" typeface="Leelawadee UI"/>
+        <a:font script="Bopo" typeface="Microsoft JhengHei"/>
+        <a:font script="Java" typeface="Javanese Text"/>
+        <a:font script="Lisu" typeface="Segoe UI"/>
+        <a:font script="Mymr" typeface="Myanmar Text"/>
+        <a:font script="Nkoo" typeface="Ebrima"/>
+        <a:font script="Olck" typeface="Nirmala UI"/>
+        <a:font script="Osma" typeface="Ebrima"/>
+        <a:font script="Phag" typeface="Phagspa"/>
+        <a:font script="Syrn" typeface="Estrangelo Edessa"/>
+        <a:font script="Syrj" typeface="Estrangelo Edessa"/>
+        <a:font script="Syre" typeface="Estrangelo Edessa"/>
+        <a:font script="Sora" typeface="Nirmala UI"/>
+        <a:font script="Tale" typeface="Microsoft Tai Le"/>
+        <a:font script="Talu" typeface="Microsoft New Tai Lue"/>
+        <a:font script="Tfng" typeface="Ebrima"/>
+      </a:majorFont>
+      <a:minorFont>
+        <a:latin typeface="Calibri" panose="020F0502020204030204"/>
+        <a:ea typeface=""/>
+        <a:cs typeface=""/>
+        <a:font script="Jpan" typeface="游ゴシック"/>
+        <a:font script="Hang" typeface="맑은 고딕"/>
+        <a:font script="Hans" typeface="等线"/>
+        <a:font script="Hant" typeface="新細明體"/>
+        <a:font script="Arab" typeface="Arial"/>
+        <a:font script="Hebr" typeface="Arial"/>
+        <a:font script="Thai" typeface="Cordia New"/>
+        <a:font script="Ethi" typeface="Nyala"/>
+        <a:font script="Beng" typeface="Vrinda"/>
+        <a:font script="Gujr" typeface="Shruti"/>
+        <a:font script="Khmr" typeface="DaunPenh"/>
+        <a:font script="Knda" typeface="Tunga"/>
+        <a:font script="Guru" typeface="Raavi"/>
+        <a:font script="Cans" typeface="Euphemia"/>
+        <a:font script="Cher" typeface="Plantagenet Cherokee"/>
+        <a:font script="Yiii" typeface="Microsoft Yi Baiti"/>
+        <a:font script="Tibt" typeface="Microsoft Himalaya"/>
+        <a:font script="Thaa" typeface="MV Boli"/>
+        <a:font script="Deva" typeface="Mangal"/>
+        <a:font script="Telu" typeface="Gautami"/>
+        <a:font script="Taml" typeface="Latha"/>
+        <a:font script="Syrc" typeface="Estrangelo Edessa"/>
+        <a:font script="Orya" typeface="Kalinga"/>
+        <a:font script="Mlym" typeface="Kartika"/>
+        <a:font script="Laoo" typeface="DokChampa"/>
+        <a:font script="Sinh" typeface="Iskoola Pota"/>
+        <a:font script="Mong" typeface="Mongolian Baiti"/>
+        <a:font script="Viet" typeface="Arial"/>
+        <a:font script="Uigh" typeface="Microsoft Uighur"/>
+        <a:font script="Geor" typeface="Sylfaen"/>
+        <a:font script="Armn" typeface="Arial"/>
+        <a:font script="Bugi" typeface="Leelawadee UI"/>
+        <a:font script="Bopo" typeface="Microsoft JhengHei"/>
+        <a:font script="Java" typeface="Javanese Text"/>
+        <a:font script="Lisu" typeface="Segoe UI"/>
+        <a:font script="Mymr" typeface="Myanmar Text"/>
+        <a:font script="Nkoo" typeface="Ebrima"/>
+        <a:font script="Olck" typeface="Nirmala UI"/>
+        <a:font script="Osma" typeface="Ebrima"/>
+        <a:font script="Phag" typeface="Phagspa"/>
+        <a:font script="Syrn" typeface="Estrangelo Edessa"/>
+        <a:font script="Syrj" typeface="Estrangelo Edessa"/>
+        <a:font script="Syre" typeface="Estrangelo Edessa"/>
+        <a:font script="Sora" typeface="Nirmala UI"/>
+        <a:font script="Tale" typeface="Microsoft Tai Le"/>
+        <a:font script="Talu" typeface="Microsoft New Tai Lue"/>
+        <a:font script="Tfng" typeface="Ebrima"/>
+      </a:minorFont>
+    </a:fontScheme>
+    <a:fmtScheme name="Office">
+      <a:fillStyleLst>
+        <a:solidFill>
+          <a:schemeClr val="phClr"/>
+        </a:solidFill>
+        <a:gradFill rotWithShape="1">
+          <a:gsLst>
+            <a:gs pos="0">
+              <a:schemeClr val="phClr">
+                <a:lumMod val="110000"/>
+                <a:satMod val="105000"/>
+                <a:tint val="67000"/>
+              </a:schemeClr>
+            </a:gs>
+            <a:gs pos="50000">
+              <a:schemeClr val="phClr">
+                <a:lumMod val="105000"/>
+                <a:satMod val="103000"/>
+                <a:tint val="73000"/>
+              </a:schemeClr>
+            </a:gs>
+            <a:gs pos="100000">
+              <a:schemeClr val="phClr">
+                <a:lumMod val="105000"/>
+                <a:satMod val="109000"/>
+                <a:tint val="81000"/>
+              </a:schemeClr>
+            </a:gs>
+          </a:gsLst>
+          <a:lin ang="5400000" scaled="0"/>
+        </a:gradFill>
+        <a:gradFill rotWithShape="1">
+          <a:gsLst>
+            <a:gs pos="0">
+              <a:schemeClr val="phClr">
+                <a:satMod val="103000"/>
+                <a:lumMod val="102000"/>
+                <a:tint val="94000"/>
+              </a:schemeClr>
+            </a:gs>
+            <a:gs pos="50000">
+              <a:schemeClr val="phClr">
+                <a:satMod val="110000"/>
+                <a:lumMod val="100000"/>
+                <a:shade val="100000"/>
+              </a:schemeClr>
+            </a:gs>
+            <a:gs pos="100000">
+              <a:schemeClr val="phClr">
+                <a:lumMod val="99000"/>
+                <a:satMod val="120000"/>
+                <a:shade val="78000"/>
+              </a:schemeClr>
+            </a:gs>
+          </a:gsLst>
+          <a:lin ang="5400000" scaled="0"/>
+        </a:gradFill>
+      </a:fillStyleLst>
+      <a:lnStyleLst>
+        <a:ln w="6350" cap="flat" cmpd="sng" algn="ctr">
+          <a:solidFill>
+            <a:schemeClr val="phClr"/>
+          </a:solidFill>
+          <a:prstDash val="solid"/>
+          <a:miter lim="800000"/>
+        </a:ln>
+        <a:ln w="12700" cap="flat" cmpd="sng" algn="ctr">
+          <a:solidFill>
+            <a:schemeClr val="phClr"/>
+          </a:solidFill>
+          <a:prstDash val="solid"/>
+          <a:miter lim="800000"/>
+        </a:ln>
+        <a:ln w="19050" cap="flat" cmpd="sng" algn="ctr">
+          <a:solidFill>
+            <a:schemeClr val="phClr"/>
+          </a:solidFill>
+          <a:prstDash val="solid"/>
+          <a:miter lim="800000"/>
+        </a:ln>
+      </a:lnStyleLst>
+      <a:effectStyleLst>
+        <a:effectStyle>
+          <a:effectLst/>
+        </a:effectStyle>
+        <a:effectStyle>
+          <a:effectLst/>
+        </a:effectStyle>
+        <a:effectStyle>
+          <a:effectLst>
+            <a:outerShdw blurRad="57150" dist="19050" dir="5400000" algn="ctr" rotWithShape="0">
+              <a:srgbClr val="000000">
+                <a:alpha val="63000"/>
+              </a:srgbClr>
+            </a:outerShdw>
+          </a:effectLst>
+        </a:effectStyle>
+      </a:effectStyleLst>
+      <a:bgFillStyleLst>
+        <a:solidFill>
+          <a:schemeClr val="phClr"/>
+        </a:solidFill>
+        <a:solidFill>
+          <a:schemeClr val="phClr">
+            <a:tint val="95000"/>
+            <a:satMod val="170000"/>
+          </a:schemeClr>
+        </a:solidFill>
+        <a:gradFill rotWithShape="1">
+          <a:gsLst>
+            <a:gs pos="0">
+              <a:schemeClr val="phClr">
+                <a:tint val="93000"/>
+                <a:satMod val="150000"/>
+                <a:shade val="98000"/>
+                <a:lumMod val="102000"/>
+              </a:schemeClr>
+            </a:gs>
+            <a:gs pos="50000">
+              <a:schemeClr val="phClr">
+                <a:tint val="98000"/>
+                <a:satMod val="130000"/>
+                <a:shade val="90000"/>
+                <a:lumMod val="103000"/>
+              </a:schemeClr>
+            </a:gs>
+            <a:gs pos="100000">
+              <a:schemeClr val="phClr">
+                <a:shade val="63000"/>
+                <a:satMod val="120000"/>
+              </a:schemeClr>
+            </a:gs>
+          </a:gsLst>
+          <a:lin ang="5400000" scaled="0"/>
+        </a:gradFill>
+      </a:bgFillStyleLst>
+    </a:fmtScheme>
+  </a:themeElements>
+  <a:objectDefaults/>
+  <a:extraClrSchemeLst/>
+  <a:extLst>
+    <a:ext uri="{05A4C25C-085E-4340-85A3-A5531E510DB2}">
+      <thm15:themeFamily xmlns:thm15="http://schemas.microsoft.com/office/thememl/2012/main" name="Office Theme" id="{62F939B6-93AF-4DB8-9C6B-D6C7DFDC589F}" vid="{4A3C46E8-61CC-4603-A589-7422A47A8E4A}"/>
+    </a:ext>
+  </a:extLst>
+</a:theme>
 </file>
</xml_diff>